<commit_message>
created graphs and poster
</commit_message>
<xml_diff>
--- a/Intern-Logs/A1_Powerpoint_Poster_Portrait_White_Background_Template.pptx
+++ b/Intern-Logs/A1_Powerpoint_Poster_Portrait_White_Background_Template.pptx
@@ -315,7 +315,7 @@
           <a:p>
             <a:fld id="{840BB966-EE47-4E85-A60A-9E3A61D1BFCB}" type="datetimeFigureOut">
               <a:rPr lang="en-GB" smtClean="0"/>
-              <a:t>23/08/2024</a:t>
+              <a:t>28/08/2024</a:t>
             </a:fld>
             <a:endParaRPr lang="en-GB"/>
           </a:p>
@@ -531,7 +531,7 @@
           <a:p>
             <a:fld id="{840BB966-EE47-4E85-A60A-9E3A61D1BFCB}" type="datetimeFigureOut">
               <a:rPr lang="en-GB" smtClean="0"/>
-              <a:t>23/08/2024</a:t>
+              <a:t>28/08/2024</a:t>
             </a:fld>
             <a:endParaRPr lang="en-GB"/>
           </a:p>
@@ -974,16 +974,867 @@
           <a:p>
             <a:pPr algn="ctr"/>
             <a:r>
-              <a:rPr lang="en-GB" sz="6200" b="1" dirty="0">
+              <a:rPr lang="en-US" sz="6200" b="1" dirty="0">
                 <a:solidFill>
                   <a:schemeClr val="tx2"/>
                 </a:solidFill>
               </a:rPr>
-              <a:t>Generating an acoustically realistic 3D indoor room scene from a single 360-degree image.</a:t>
-            </a:r>
-          </a:p>
-        </p:txBody>
-      </p:sp>
+              <a:t>Immersive Audio-Visual Virtual Reality</a:t>
+            </a:r>
+          </a:p>
+          <a:p>
+            <a:pPr algn="ctr"/>
+            <a:r>
+              <a:rPr lang="en-US" sz="6200" b="1" dirty="0">
+                <a:solidFill>
+                  <a:schemeClr val="tx2"/>
+                </a:solidFill>
+              </a:rPr>
+              <a:t>Scene Reproduction</a:t>
+            </a:r>
+            <a:endParaRPr lang="en-GB" sz="6200" b="1" dirty="0">
+              <a:solidFill>
+                <a:schemeClr val="tx2"/>
+              </a:solidFill>
+            </a:endParaRPr>
+          </a:p>
+        </p:txBody>
+      </p:sp>
+      <p:sp>
+        <p:nvSpPr>
+          <p:cNvPr id="3" name="TextBox 2">
+            <a:extLst>
+              <a:ext uri="{FF2B5EF4-FFF2-40B4-BE49-F238E27FC236}">
+                <a16:creationId xmlns:a16="http://schemas.microsoft.com/office/drawing/2014/main" id="{1977AF76-8863-89F0-6F5D-B5B67BF1C584}"/>
+              </a:ext>
+            </a:extLst>
+          </p:cNvPr>
+          <p:cNvSpPr txBox="1"/>
+          <p:nvPr/>
+        </p:nvSpPr>
+        <p:spPr>
+          <a:xfrm>
+            <a:off x="3204568" y="6248738"/>
+            <a:ext cx="15553728" cy="2554545"/>
+          </a:xfrm>
+          <a:prstGeom prst="rect">
+            <a:avLst/>
+          </a:prstGeom>
+          <a:noFill/>
+        </p:spPr>
+        <p:txBody>
+          <a:bodyPr wrap="square" rtlCol="0">
+            <a:spAutoFit/>
+          </a:bodyPr>
+          <a:lstStyle/>
+          <a:p>
+            <a:r>
+              <a:rPr lang="en-US" sz="4000" dirty="0">
+                <a:solidFill>
+                  <a:srgbClr val="00131D"/>
+                </a:solidFill>
+              </a:rPr>
+              <a:t>The motivation behind this project is to pioneer the development of a comprehensive pipeline capable of generating a VR scene with realistic visual and acoustic properties from a single omnidirectional image on a single device, ultimately optimizing the user experience. </a:t>
+            </a:r>
+            <a:endParaRPr lang="en-GB" sz="4000" dirty="0">
+              <a:solidFill>
+                <a:srgbClr val="00131D"/>
+              </a:solidFill>
+            </a:endParaRPr>
+          </a:p>
+        </p:txBody>
+      </p:sp>
+      <p:pic>
+        <p:nvPicPr>
+          <p:cNvPr id="5" name="Picture 4">
+            <a:extLst>
+              <a:ext uri="{FF2B5EF4-FFF2-40B4-BE49-F238E27FC236}">
+                <a16:creationId xmlns:a16="http://schemas.microsoft.com/office/drawing/2014/main" id="{CE8D29B9-913F-362C-30B9-79F51B9AF61A}"/>
+              </a:ext>
+            </a:extLst>
+          </p:cNvPr>
+          <p:cNvPicPr>
+            <a:picLocks noChangeAspect="1"/>
+          </p:cNvPicPr>
+          <p:nvPr/>
+        </p:nvPicPr>
+        <p:blipFill rotWithShape="1">
+          <a:blip r:embed="rId3"/>
+          <a:srcRect b="9047"/>
+          <a:stretch/>
+        </p:blipFill>
+        <p:spPr>
+          <a:xfrm>
+            <a:off x="1487732" y="9632824"/>
+            <a:ext cx="8402223" cy="4124304"/>
+          </a:xfrm>
+          <a:prstGeom prst="rect">
+            <a:avLst/>
+          </a:prstGeom>
+        </p:spPr>
+      </p:pic>
+      <p:pic>
+        <p:nvPicPr>
+          <p:cNvPr id="9" name="Picture 8">
+            <a:extLst>
+              <a:ext uri="{FF2B5EF4-FFF2-40B4-BE49-F238E27FC236}">
+                <a16:creationId xmlns:a16="http://schemas.microsoft.com/office/drawing/2014/main" id="{A5480DBF-9BF8-4AE0-BD1D-18747A3A2B15}"/>
+              </a:ext>
+            </a:extLst>
+          </p:cNvPr>
+          <p:cNvPicPr>
+            <a:picLocks noChangeAspect="1"/>
+          </p:cNvPicPr>
+          <p:nvPr/>
+        </p:nvPicPr>
+        <p:blipFill>
+          <a:blip r:embed="rId4"/>
+          <a:stretch>
+            <a:fillRect/>
+          </a:stretch>
+        </p:blipFill>
+        <p:spPr>
+          <a:xfrm>
+            <a:off x="2412480" y="21804812"/>
+            <a:ext cx="8560970" cy="6420727"/>
+          </a:xfrm>
+          <a:prstGeom prst="rect">
+            <a:avLst/>
+          </a:prstGeom>
+        </p:spPr>
+      </p:pic>
+      <p:sp>
+        <p:nvSpPr>
+          <p:cNvPr id="10" name="TextBox 9">
+            <a:extLst>
+              <a:ext uri="{FF2B5EF4-FFF2-40B4-BE49-F238E27FC236}">
+                <a16:creationId xmlns:a16="http://schemas.microsoft.com/office/drawing/2014/main" id="{3B97AD16-4A73-340C-D877-DE880E22BFDD}"/>
+              </a:ext>
+            </a:extLst>
+          </p:cNvPr>
+          <p:cNvSpPr txBox="1"/>
+          <p:nvPr/>
+        </p:nvSpPr>
+        <p:spPr>
+          <a:xfrm>
+            <a:off x="2986410" y="28461467"/>
+            <a:ext cx="7413110" cy="1200329"/>
+          </a:xfrm>
+          <a:prstGeom prst="rect">
+            <a:avLst/>
+          </a:prstGeom>
+          <a:noFill/>
+        </p:spPr>
+        <p:txBody>
+          <a:bodyPr wrap="square" rtlCol="0">
+            <a:spAutoFit/>
+          </a:bodyPr>
+          <a:lstStyle/>
+          <a:p>
+            <a:r>
+              <a:rPr lang="en-US" sz="2400" dirty="0">
+                <a:solidFill>
+                  <a:srgbClr val="00131D"/>
+                </a:solidFill>
+              </a:rPr>
+              <a:t>Figure 6: EDTs for the five rooms, related to the estimated RIRs in VR environment. The dashed lines show the JND limit of 5% (</a:t>
+            </a:r>
+            <a:r>
+              <a:rPr lang="en-US" sz="2400" dirty="0" err="1">
+                <a:solidFill>
+                  <a:srgbClr val="00131D"/>
+                </a:solidFill>
+              </a:rPr>
+              <a:t>Vorländer</a:t>
+            </a:r>
+            <a:r>
+              <a:rPr lang="en-US" sz="2400" dirty="0">
+                <a:solidFill>
+                  <a:srgbClr val="00131D"/>
+                </a:solidFill>
+              </a:rPr>
+              <a:t> 1995).</a:t>
+            </a:r>
+            <a:endParaRPr lang="en-GB" sz="2400" dirty="0">
+              <a:solidFill>
+                <a:srgbClr val="00131D"/>
+              </a:solidFill>
+            </a:endParaRPr>
+          </a:p>
+        </p:txBody>
+      </p:sp>
+      <p:pic>
+        <p:nvPicPr>
+          <p:cNvPr id="14" name="Picture 13">
+            <a:extLst>
+              <a:ext uri="{FF2B5EF4-FFF2-40B4-BE49-F238E27FC236}">
+                <a16:creationId xmlns:a16="http://schemas.microsoft.com/office/drawing/2014/main" id="{4CC9742E-55F1-9B4D-40DF-E034CA221F98}"/>
+              </a:ext>
+            </a:extLst>
+          </p:cNvPr>
+          <p:cNvPicPr>
+            <a:picLocks noChangeAspect="1"/>
+          </p:cNvPicPr>
+          <p:nvPr/>
+        </p:nvPicPr>
+        <p:blipFill>
+          <a:blip r:embed="rId5"/>
+          <a:stretch>
+            <a:fillRect/>
+          </a:stretch>
+        </p:blipFill>
+        <p:spPr>
+          <a:xfrm>
+            <a:off x="10045328" y="8803283"/>
+            <a:ext cx="5144218" cy="5649113"/>
+          </a:xfrm>
+          <a:prstGeom prst="rect">
+            <a:avLst/>
+          </a:prstGeom>
+        </p:spPr>
+      </p:pic>
+      <p:sp>
+        <p:nvSpPr>
+          <p:cNvPr id="15" name="TextBox 14">
+            <a:extLst>
+              <a:ext uri="{FF2B5EF4-FFF2-40B4-BE49-F238E27FC236}">
+                <a16:creationId xmlns:a16="http://schemas.microsoft.com/office/drawing/2014/main" id="{011EE12B-05FE-BD63-B86C-C6D041F8AD55}"/>
+              </a:ext>
+            </a:extLst>
+          </p:cNvPr>
+          <p:cNvSpPr txBox="1"/>
+          <p:nvPr/>
+        </p:nvSpPr>
+        <p:spPr>
+          <a:xfrm>
+            <a:off x="1764408" y="13947000"/>
+            <a:ext cx="7848872" cy="461665"/>
+          </a:xfrm>
+          <a:prstGeom prst="rect">
+            <a:avLst/>
+          </a:prstGeom>
+          <a:noFill/>
+        </p:spPr>
+        <p:txBody>
+          <a:bodyPr wrap="square" rtlCol="0">
+            <a:spAutoFit/>
+          </a:bodyPr>
+          <a:lstStyle/>
+          <a:p>
+            <a:r>
+              <a:rPr lang="en-US" sz="2400" dirty="0">
+                <a:solidFill>
+                  <a:srgbClr val="00131D"/>
+                </a:solidFill>
+              </a:rPr>
+              <a:t>Fig 1: Diagram showing the flow of the project pipeline. </a:t>
+            </a:r>
+            <a:endParaRPr lang="en-GB" sz="2400" dirty="0">
+              <a:solidFill>
+                <a:srgbClr val="00131D"/>
+              </a:solidFill>
+            </a:endParaRPr>
+          </a:p>
+        </p:txBody>
+      </p:sp>
+      <p:sp>
+        <p:nvSpPr>
+          <p:cNvPr id="16" name="TextBox 15">
+            <a:extLst>
+              <a:ext uri="{FF2B5EF4-FFF2-40B4-BE49-F238E27FC236}">
+                <a16:creationId xmlns:a16="http://schemas.microsoft.com/office/drawing/2014/main" id="{8D1F718D-18A2-2CEC-8FBA-E5E13717140B}"/>
+              </a:ext>
+            </a:extLst>
+          </p:cNvPr>
+          <p:cNvSpPr txBox="1"/>
+          <p:nvPr/>
+        </p:nvSpPr>
+        <p:spPr>
+          <a:xfrm>
+            <a:off x="1548384" y="8803283"/>
+            <a:ext cx="8064896" cy="982927"/>
+          </a:xfrm>
+          <a:prstGeom prst="rect">
+            <a:avLst/>
+          </a:prstGeom>
+          <a:noFill/>
+        </p:spPr>
+        <p:txBody>
+          <a:bodyPr wrap="square" rtlCol="0">
+            <a:spAutoFit/>
+          </a:bodyPr>
+          <a:lstStyle/>
+          <a:p>
+            <a:endParaRPr lang="en-GB" dirty="0"/>
+          </a:p>
+        </p:txBody>
+      </p:sp>
+      <p:pic>
+        <p:nvPicPr>
+          <p:cNvPr id="18" name="Picture 17">
+            <a:extLst>
+              <a:ext uri="{FF2B5EF4-FFF2-40B4-BE49-F238E27FC236}">
+                <a16:creationId xmlns:a16="http://schemas.microsoft.com/office/drawing/2014/main" id="{1DF56B10-5D70-1B1A-8FE6-FF87181A7780}"/>
+              </a:ext>
+            </a:extLst>
+          </p:cNvPr>
+          <p:cNvPicPr>
+            <a:picLocks noChangeAspect="1"/>
+          </p:cNvPicPr>
+          <p:nvPr/>
+        </p:nvPicPr>
+        <p:blipFill>
+          <a:blip r:embed="rId6"/>
+          <a:stretch>
+            <a:fillRect/>
+          </a:stretch>
+        </p:blipFill>
+        <p:spPr>
+          <a:xfrm>
+            <a:off x="10901078" y="21761080"/>
+            <a:ext cx="8560969" cy="6420727"/>
+          </a:xfrm>
+          <a:prstGeom prst="rect">
+            <a:avLst/>
+          </a:prstGeom>
+        </p:spPr>
+      </p:pic>
+      <p:sp>
+        <p:nvSpPr>
+          <p:cNvPr id="19" name="TextBox 18">
+            <a:extLst>
+              <a:ext uri="{FF2B5EF4-FFF2-40B4-BE49-F238E27FC236}">
+                <a16:creationId xmlns:a16="http://schemas.microsoft.com/office/drawing/2014/main" id="{CDD00EB8-E690-A548-767F-750DB7233EB6}"/>
+              </a:ext>
+            </a:extLst>
+          </p:cNvPr>
+          <p:cNvSpPr txBox="1"/>
+          <p:nvPr/>
+        </p:nvSpPr>
+        <p:spPr>
+          <a:xfrm>
+            <a:off x="5364808" y="20785457"/>
+            <a:ext cx="10153128" cy="975623"/>
+          </a:xfrm>
+          <a:prstGeom prst="rect">
+            <a:avLst/>
+          </a:prstGeom>
+          <a:noFill/>
+        </p:spPr>
+        <p:txBody>
+          <a:bodyPr wrap="square" rtlCol="0">
+            <a:spAutoFit/>
+          </a:bodyPr>
+          <a:lstStyle/>
+          <a:p>
+            <a:pPr algn="ctr"/>
+            <a:r>
+              <a:rPr lang="en-US" dirty="0">
+                <a:ln w="0"/>
+                <a:solidFill>
+                  <a:schemeClr val="tx2"/>
+                </a:solidFill>
+                <a:effectLst>
+                  <a:outerShdw blurRad="38100" dist="25400" dir="5400000" algn="ctr" rotWithShape="0">
+                    <a:srgbClr val="6E747A">
+                      <a:alpha val="43000"/>
+                    </a:srgbClr>
+                  </a:outerShdw>
+                </a:effectLst>
+              </a:rPr>
+              <a:t>Results</a:t>
+            </a:r>
+            <a:endParaRPr lang="en-GB" dirty="0">
+              <a:solidFill>
+                <a:schemeClr val="tx2"/>
+              </a:solidFill>
+            </a:endParaRPr>
+          </a:p>
+        </p:txBody>
+      </p:sp>
+      <p:cxnSp>
+        <p:nvCxnSpPr>
+          <p:cNvPr id="25" name="Connector: Elbow 24">
+            <a:extLst>
+              <a:ext uri="{FF2B5EF4-FFF2-40B4-BE49-F238E27FC236}">
+                <a16:creationId xmlns:a16="http://schemas.microsoft.com/office/drawing/2014/main" id="{7CBD5B14-F761-BDAE-7B62-0FCDB6EDF397}"/>
+              </a:ext>
+            </a:extLst>
+          </p:cNvPr>
+          <p:cNvCxnSpPr>
+            <a:cxnSpLocks/>
+          </p:cNvCxnSpPr>
+          <p:nvPr/>
+        </p:nvCxnSpPr>
+        <p:spPr>
+          <a:xfrm>
+            <a:off x="11989544" y="22225617"/>
+            <a:ext cx="6696744" cy="5256584"/>
+          </a:xfrm>
+          <a:prstGeom prst="bentConnector3">
+            <a:avLst>
+              <a:gd name="adj1" fmla="val 99782"/>
+            </a:avLst>
+          </a:prstGeom>
+        </p:spPr>
+        <p:style>
+          <a:lnRef idx="1">
+            <a:schemeClr val="dk1"/>
+          </a:lnRef>
+          <a:fillRef idx="0">
+            <a:schemeClr val="dk1"/>
+          </a:fillRef>
+          <a:effectRef idx="0">
+            <a:schemeClr val="dk1"/>
+          </a:effectRef>
+          <a:fontRef idx="minor">
+            <a:schemeClr val="tx1"/>
+          </a:fontRef>
+        </p:style>
+      </p:cxnSp>
+      <p:sp>
+        <p:nvSpPr>
+          <p:cNvPr id="30" name="TextBox 29">
+            <a:extLst>
+              <a:ext uri="{FF2B5EF4-FFF2-40B4-BE49-F238E27FC236}">
+                <a16:creationId xmlns:a16="http://schemas.microsoft.com/office/drawing/2014/main" id="{7365E1F7-6107-9091-DD04-FDCBA53E5D9D}"/>
+              </a:ext>
+            </a:extLst>
+          </p:cNvPr>
+          <p:cNvSpPr txBox="1"/>
+          <p:nvPr/>
+        </p:nvSpPr>
+        <p:spPr>
+          <a:xfrm>
+            <a:off x="11293130" y="28457918"/>
+            <a:ext cx="7776864" cy="1200329"/>
+          </a:xfrm>
+          <a:prstGeom prst="rect">
+            <a:avLst/>
+          </a:prstGeom>
+          <a:noFill/>
+        </p:spPr>
+        <p:txBody>
+          <a:bodyPr wrap="square" rtlCol="0">
+            <a:spAutoFit/>
+          </a:bodyPr>
+          <a:lstStyle/>
+          <a:p>
+            <a:r>
+              <a:rPr lang="en-US" sz="2400" dirty="0">
+                <a:solidFill>
+                  <a:srgbClr val="00131D"/>
+                </a:solidFill>
+              </a:rPr>
+              <a:t>Figure 7: RT60s for the five rooms, related to the estimated RIRs in VR environment. The dashed lines show the JND limit of 20% (Meng et al. 2006).</a:t>
+            </a:r>
+            <a:endParaRPr lang="en-GB" sz="2400" dirty="0">
+              <a:solidFill>
+                <a:srgbClr val="00131D"/>
+              </a:solidFill>
+            </a:endParaRPr>
+          </a:p>
+        </p:txBody>
+      </p:sp>
+      <p:pic>
+        <p:nvPicPr>
+          <p:cNvPr id="34" name="Picture 33">
+            <a:extLst>
+              <a:ext uri="{FF2B5EF4-FFF2-40B4-BE49-F238E27FC236}">
+                <a16:creationId xmlns:a16="http://schemas.microsoft.com/office/drawing/2014/main" id="{EC782A29-293E-2E5B-4C5C-347AC5AC8564}"/>
+              </a:ext>
+            </a:extLst>
+          </p:cNvPr>
+          <p:cNvPicPr>
+            <a:picLocks noChangeAspect="1"/>
+          </p:cNvPicPr>
+          <p:nvPr/>
+        </p:nvPicPr>
+        <p:blipFill>
+          <a:blip r:embed="rId7"/>
+          <a:stretch>
+            <a:fillRect/>
+          </a:stretch>
+        </p:blipFill>
+        <p:spPr>
+          <a:xfrm>
+            <a:off x="12511892" y="14916933"/>
+            <a:ext cx="7920880" cy="4437416"/>
+          </a:xfrm>
+          <a:prstGeom prst="rect">
+            <a:avLst/>
+          </a:prstGeom>
+        </p:spPr>
+      </p:pic>
+      <p:pic>
+        <p:nvPicPr>
+          <p:cNvPr id="36" name="Picture 35">
+            <a:extLst>
+              <a:ext uri="{FF2B5EF4-FFF2-40B4-BE49-F238E27FC236}">
+                <a16:creationId xmlns:a16="http://schemas.microsoft.com/office/drawing/2014/main" id="{47F2434A-7627-AED4-BB21-49492BE8615E}"/>
+              </a:ext>
+            </a:extLst>
+          </p:cNvPr>
+          <p:cNvPicPr>
+            <a:picLocks noChangeAspect="1"/>
+          </p:cNvPicPr>
+          <p:nvPr/>
+        </p:nvPicPr>
+        <p:blipFill>
+          <a:blip r:embed="rId8" cstate="print">
+            <a:extLst>
+              <a:ext uri="{28A0092B-C50C-407E-A947-70E740481C1C}">
+                <a14:useLocalDpi xmlns:a14="http://schemas.microsoft.com/office/drawing/2010/main" val="0"/>
+              </a:ext>
+            </a:extLst>
+          </a:blip>
+          <a:stretch>
+            <a:fillRect/>
+          </a:stretch>
+        </p:blipFill>
+        <p:spPr>
+          <a:xfrm>
+            <a:off x="1026990" y="14906336"/>
+            <a:ext cx="9720126" cy="4860063"/>
+          </a:xfrm>
+          <a:prstGeom prst="rect">
+            <a:avLst/>
+          </a:prstGeom>
+        </p:spPr>
+      </p:pic>
+      <p:sp>
+        <p:nvSpPr>
+          <p:cNvPr id="37" name="Arrow: Right 36">
+            <a:extLst>
+              <a:ext uri="{FF2B5EF4-FFF2-40B4-BE49-F238E27FC236}">
+                <a16:creationId xmlns:a16="http://schemas.microsoft.com/office/drawing/2014/main" id="{7A1DB6BE-C4F7-CDF6-C2D5-99DAE792B414}"/>
+              </a:ext>
+            </a:extLst>
+          </p:cNvPr>
+          <p:cNvSpPr/>
+          <p:nvPr/>
+        </p:nvSpPr>
+        <p:spPr>
+          <a:xfrm>
+            <a:off x="10981432" y="16436131"/>
+            <a:ext cx="1296144" cy="1368152"/>
+          </a:xfrm>
+          <a:prstGeom prst="rightArrow">
+            <a:avLst/>
+          </a:prstGeom>
+        </p:spPr>
+        <p:style>
+          <a:lnRef idx="2">
+            <a:schemeClr val="dk1">
+              <a:shade val="15000"/>
+            </a:schemeClr>
+          </a:lnRef>
+          <a:fillRef idx="1">
+            <a:schemeClr val="dk1"/>
+          </a:fillRef>
+          <a:effectRef idx="0">
+            <a:schemeClr val="dk1"/>
+          </a:effectRef>
+          <a:fontRef idx="minor">
+            <a:schemeClr val="lt1"/>
+          </a:fontRef>
+        </p:style>
+        <p:txBody>
+          <a:bodyPr rtlCol="0" anchor="ctr"/>
+          <a:lstStyle/>
+          <a:p>
+            <a:pPr algn="ctr"/>
+            <a:endParaRPr lang="en-GB">
+              <a:ln w="0"/>
+              <a:solidFill>
+                <a:schemeClr val="accent1"/>
+              </a:solidFill>
+              <a:effectLst>
+                <a:outerShdw blurRad="38100" dist="25400" dir="5400000" algn="ctr" rotWithShape="0">
+                  <a:srgbClr val="6E747A">
+                    <a:alpha val="43000"/>
+                  </a:srgbClr>
+                </a:outerShdw>
+              </a:effectLst>
+            </a:endParaRPr>
+          </a:p>
+        </p:txBody>
+      </p:sp>
+      <p:sp>
+        <p:nvSpPr>
+          <p:cNvPr id="40" name="TextBox 39">
+            <a:extLst>
+              <a:ext uri="{FF2B5EF4-FFF2-40B4-BE49-F238E27FC236}">
+                <a16:creationId xmlns:a16="http://schemas.microsoft.com/office/drawing/2014/main" id="{F62F8045-2677-7FC8-2D57-927171EAB06C}"/>
+              </a:ext>
+            </a:extLst>
+          </p:cNvPr>
+          <p:cNvSpPr txBox="1"/>
+          <p:nvPr/>
+        </p:nvSpPr>
+        <p:spPr>
+          <a:xfrm>
+            <a:off x="1026990" y="20066754"/>
+            <a:ext cx="7848872" cy="461665"/>
+          </a:xfrm>
+          <a:prstGeom prst="rect">
+            <a:avLst/>
+          </a:prstGeom>
+          <a:noFill/>
+        </p:spPr>
+        <p:txBody>
+          <a:bodyPr wrap="square" rtlCol="0">
+            <a:spAutoFit/>
+          </a:bodyPr>
+          <a:lstStyle/>
+          <a:p>
+            <a:r>
+              <a:rPr lang="en-US" sz="2400" dirty="0">
+                <a:solidFill>
+                  <a:srgbClr val="00131D"/>
+                </a:solidFill>
+              </a:rPr>
+              <a:t>Fig 4: Original image of Kitchen indoor room scene.</a:t>
+            </a:r>
+            <a:endParaRPr lang="en-GB" sz="2400" dirty="0">
+              <a:solidFill>
+                <a:srgbClr val="00131D"/>
+              </a:solidFill>
+            </a:endParaRPr>
+          </a:p>
+        </p:txBody>
+      </p:sp>
+      <p:sp>
+        <p:nvSpPr>
+          <p:cNvPr id="41" name="TextBox 40">
+            <a:extLst>
+              <a:ext uri="{FF2B5EF4-FFF2-40B4-BE49-F238E27FC236}">
+                <a16:creationId xmlns:a16="http://schemas.microsoft.com/office/drawing/2014/main" id="{5FF6D295-DA9A-2FBB-C03A-D855D86A9D9C}"/>
+              </a:ext>
+            </a:extLst>
+          </p:cNvPr>
+          <p:cNvSpPr txBox="1"/>
+          <p:nvPr/>
+        </p:nvSpPr>
+        <p:spPr>
+          <a:xfrm>
+            <a:off x="12634601" y="19651256"/>
+            <a:ext cx="7848872" cy="830997"/>
+          </a:xfrm>
+          <a:prstGeom prst="rect">
+            <a:avLst/>
+          </a:prstGeom>
+          <a:noFill/>
+        </p:spPr>
+        <p:txBody>
+          <a:bodyPr wrap="square" rtlCol="0">
+            <a:spAutoFit/>
+          </a:bodyPr>
+          <a:lstStyle/>
+          <a:p>
+            <a:r>
+              <a:rPr lang="en-US" sz="2400" dirty="0">
+                <a:solidFill>
+                  <a:srgbClr val="00131D"/>
+                </a:solidFill>
+              </a:rPr>
+              <a:t>Fig 5: Comparison of different meshes generated by proposed method, LiDAR scan, Kim19 and Kim21.</a:t>
+            </a:r>
+            <a:endParaRPr lang="en-GB" sz="2400" dirty="0">
+              <a:solidFill>
+                <a:srgbClr val="00131D"/>
+              </a:solidFill>
+            </a:endParaRPr>
+          </a:p>
+        </p:txBody>
+      </p:sp>
+      <p:sp>
+        <p:nvSpPr>
+          <p:cNvPr id="42" name="TextBox 41">
+            <a:extLst>
+              <a:ext uri="{FF2B5EF4-FFF2-40B4-BE49-F238E27FC236}">
+                <a16:creationId xmlns:a16="http://schemas.microsoft.com/office/drawing/2014/main" id="{9661AF03-557B-632C-FD0E-B43CD60652FE}"/>
+              </a:ext>
+            </a:extLst>
+          </p:cNvPr>
+          <p:cNvSpPr txBox="1"/>
+          <p:nvPr/>
+        </p:nvSpPr>
+        <p:spPr>
+          <a:xfrm>
+            <a:off x="15517936" y="13380203"/>
+            <a:ext cx="5256584" cy="1200329"/>
+          </a:xfrm>
+          <a:prstGeom prst="rect">
+            <a:avLst/>
+          </a:prstGeom>
+          <a:noFill/>
+        </p:spPr>
+        <p:txBody>
+          <a:bodyPr wrap="square" rtlCol="0">
+            <a:spAutoFit/>
+          </a:bodyPr>
+          <a:lstStyle/>
+          <a:p>
+            <a:r>
+              <a:rPr lang="en-US" sz="2400" dirty="0">
+                <a:solidFill>
+                  <a:srgbClr val="00131D"/>
+                </a:solidFill>
+              </a:rPr>
+              <a:t>Fig 3 (left): The GUI app for the pipeline, which is only few clicks after setup is done properly.</a:t>
+            </a:r>
+            <a:endParaRPr lang="en-GB" sz="2400" dirty="0">
+              <a:solidFill>
+                <a:srgbClr val="00131D"/>
+              </a:solidFill>
+            </a:endParaRPr>
+          </a:p>
+        </p:txBody>
+      </p:sp>
+      <p:sp>
+        <p:nvSpPr>
+          <p:cNvPr id="43" name="TextBox 42">
+            <a:extLst>
+              <a:ext uri="{FF2B5EF4-FFF2-40B4-BE49-F238E27FC236}">
+                <a16:creationId xmlns:a16="http://schemas.microsoft.com/office/drawing/2014/main" id="{2E8D9BCC-C848-6710-545C-AE39D42074B7}"/>
+              </a:ext>
+            </a:extLst>
+          </p:cNvPr>
+          <p:cNvSpPr txBox="1"/>
+          <p:nvPr/>
+        </p:nvSpPr>
+        <p:spPr>
+          <a:xfrm>
+            <a:off x="15531900" y="353346"/>
+            <a:ext cx="5524987" cy="1200329"/>
+          </a:xfrm>
+          <a:prstGeom prst="rect">
+            <a:avLst/>
+          </a:prstGeom>
+          <a:noFill/>
+        </p:spPr>
+        <p:txBody>
+          <a:bodyPr wrap="square" rtlCol="0">
+            <a:spAutoFit/>
+          </a:bodyPr>
+          <a:lstStyle/>
+          <a:p>
+            <a:r>
+              <a:rPr lang="en-US" sz="3600" dirty="0"/>
+              <a:t>Muhammad </a:t>
+            </a:r>
+            <a:r>
+              <a:rPr lang="en-US" sz="3600" dirty="0" err="1"/>
+              <a:t>Hazimi</a:t>
+            </a:r>
+            <a:r>
+              <a:rPr lang="en-US" sz="3600" dirty="0"/>
+              <a:t> Bin </a:t>
+            </a:r>
+            <a:r>
+              <a:rPr lang="en-US" sz="3600" dirty="0" err="1"/>
+              <a:t>Yusri</a:t>
+            </a:r>
+            <a:r>
+              <a:rPr lang="en-US" sz="3600" dirty="0"/>
+              <a:t> mhby1g21@soton.ac.uk</a:t>
+            </a:r>
+            <a:endParaRPr lang="en-GB" sz="3600" dirty="0"/>
+          </a:p>
+        </p:txBody>
+      </p:sp>
+      <p:sp>
+        <p:nvSpPr>
+          <p:cNvPr id="45" name="TextBox 44">
+            <a:extLst>
+              <a:ext uri="{FF2B5EF4-FFF2-40B4-BE49-F238E27FC236}">
+                <a16:creationId xmlns:a16="http://schemas.microsoft.com/office/drawing/2014/main" id="{CDACB301-592A-D167-15B2-02DBF9EB4A92}"/>
+              </a:ext>
+            </a:extLst>
+          </p:cNvPr>
+          <p:cNvSpPr txBox="1"/>
+          <p:nvPr/>
+        </p:nvSpPr>
+        <p:spPr>
+          <a:xfrm>
+            <a:off x="15517936" y="12442836"/>
+            <a:ext cx="5256584" cy="830997"/>
+          </a:xfrm>
+          <a:prstGeom prst="rect">
+            <a:avLst/>
+          </a:prstGeom>
+          <a:noFill/>
+        </p:spPr>
+        <p:txBody>
+          <a:bodyPr wrap="square" rtlCol="0">
+            <a:spAutoFit/>
+          </a:bodyPr>
+          <a:lstStyle/>
+          <a:p>
+            <a:r>
+              <a:rPr lang="en-US" sz="2400" dirty="0">
+                <a:solidFill>
+                  <a:srgbClr val="00131D"/>
+                </a:solidFill>
+              </a:rPr>
+              <a:t>Fig 2 (top): The QR code directs to the project’s GitHub repository.</a:t>
+            </a:r>
+            <a:endParaRPr lang="en-GB" sz="2400" dirty="0">
+              <a:solidFill>
+                <a:srgbClr val="00131D"/>
+              </a:solidFill>
+            </a:endParaRPr>
+          </a:p>
+        </p:txBody>
+      </p:sp>
+      <p:pic>
+        <p:nvPicPr>
+          <p:cNvPr id="1026" name="Picture 2" descr="QR Code Image">
+            <a:extLst>
+              <a:ext uri="{FF2B5EF4-FFF2-40B4-BE49-F238E27FC236}">
+                <a16:creationId xmlns:a16="http://schemas.microsoft.com/office/drawing/2014/main" id="{C37639B9-61BE-510B-291D-5CBDD818B4BE}"/>
+              </a:ext>
+            </a:extLst>
+          </p:cNvPr>
+          <p:cNvPicPr>
+            <a:picLocks noChangeAspect="1" noChangeArrowheads="1"/>
+          </p:cNvPicPr>
+          <p:nvPr/>
+        </p:nvPicPr>
+        <p:blipFill>
+          <a:blip r:embed="rId9">
+            <a:extLst>
+              <a:ext uri="{28A0092B-C50C-407E-A947-70E740481C1C}">
+                <a14:useLocalDpi xmlns:a14="http://schemas.microsoft.com/office/drawing/2010/main" val="0"/>
+              </a:ext>
+            </a:extLst>
+          </a:blip>
+          <a:srcRect/>
+          <a:stretch>
+            <a:fillRect/>
+          </a:stretch>
+        </p:blipFill>
+        <p:spPr bwMode="auto">
+          <a:xfrm>
+            <a:off x="16111727" y="8195456"/>
+            <a:ext cx="4141010" cy="4141010"/>
+          </a:xfrm>
+          <a:prstGeom prst="rect">
+            <a:avLst/>
+          </a:prstGeom>
+          <a:noFill/>
+          <a:extLst>
+            <a:ext uri="{909E8E84-426E-40DD-AFC4-6F175D3DCCD1}">
+              <a14:hiddenFill xmlns:a14="http://schemas.microsoft.com/office/drawing/2010/main">
+                <a:solidFill>
+                  <a:srgbClr val="FFFFFF"/>
+                </a:solidFill>
+              </a14:hiddenFill>
+            </a:ext>
+          </a:extLst>
+        </p:spPr>
+      </p:pic>
     </p:spTree>
     <p:custDataLst>
       <p:tags r:id="rId1"/>

</xml_diff>